<commit_message>
Female opposite-sex network analysis
</commit_message>
<xml_diff>
--- a/males_summer_2023/soc_exp_ms_figs.pptx
+++ b/males_summer_2023/soc_exp_ms_figs.pptx
@@ -265,7 +265,7 @@
           <a:p>
             <a:fld id="{65368BD6-7643-4418-A51B-0F021EBB43CE}" type="datetimeFigureOut">
               <a:rPr lang="en-CA" smtClean="0"/>
-              <a:t>2023-06-29</a:t>
+              <a:t>2023-06-30</a:t>
             </a:fld>
             <a:endParaRPr lang="en-CA"/>
           </a:p>
@@ -465,7 +465,7 @@
           <a:p>
             <a:fld id="{65368BD6-7643-4418-A51B-0F021EBB43CE}" type="datetimeFigureOut">
               <a:rPr lang="en-CA" smtClean="0"/>
-              <a:t>2023-06-29</a:t>
+              <a:t>2023-06-30</a:t>
             </a:fld>
             <a:endParaRPr lang="en-CA"/>
           </a:p>
@@ -675,7 +675,7 @@
           <a:p>
             <a:fld id="{65368BD6-7643-4418-A51B-0F021EBB43CE}" type="datetimeFigureOut">
               <a:rPr lang="en-CA" smtClean="0"/>
-              <a:t>2023-06-29</a:t>
+              <a:t>2023-06-30</a:t>
             </a:fld>
             <a:endParaRPr lang="en-CA"/>
           </a:p>
@@ -875,7 +875,7 @@
           <a:p>
             <a:fld id="{65368BD6-7643-4418-A51B-0F021EBB43CE}" type="datetimeFigureOut">
               <a:rPr lang="en-CA" smtClean="0"/>
-              <a:t>2023-06-29</a:t>
+              <a:t>2023-06-30</a:t>
             </a:fld>
             <a:endParaRPr lang="en-CA"/>
           </a:p>
@@ -1151,7 +1151,7 @@
           <a:p>
             <a:fld id="{65368BD6-7643-4418-A51B-0F021EBB43CE}" type="datetimeFigureOut">
               <a:rPr lang="en-CA" smtClean="0"/>
-              <a:t>2023-06-29</a:t>
+              <a:t>2023-06-30</a:t>
             </a:fld>
             <a:endParaRPr lang="en-CA"/>
           </a:p>
@@ -1419,7 +1419,7 @@
           <a:p>
             <a:fld id="{65368BD6-7643-4418-A51B-0F021EBB43CE}" type="datetimeFigureOut">
               <a:rPr lang="en-CA" smtClean="0"/>
-              <a:t>2023-06-29</a:t>
+              <a:t>2023-06-30</a:t>
             </a:fld>
             <a:endParaRPr lang="en-CA"/>
           </a:p>
@@ -1834,7 +1834,7 @@
           <a:p>
             <a:fld id="{65368BD6-7643-4418-A51B-0F021EBB43CE}" type="datetimeFigureOut">
               <a:rPr lang="en-CA" smtClean="0"/>
-              <a:t>2023-06-29</a:t>
+              <a:t>2023-06-30</a:t>
             </a:fld>
             <a:endParaRPr lang="en-CA"/>
           </a:p>
@@ -1976,7 +1976,7 @@
           <a:p>
             <a:fld id="{65368BD6-7643-4418-A51B-0F021EBB43CE}" type="datetimeFigureOut">
               <a:rPr lang="en-CA" smtClean="0"/>
-              <a:t>2023-06-29</a:t>
+              <a:t>2023-06-30</a:t>
             </a:fld>
             <a:endParaRPr lang="en-CA"/>
           </a:p>
@@ -2089,7 +2089,7 @@
           <a:p>
             <a:fld id="{65368BD6-7643-4418-A51B-0F021EBB43CE}" type="datetimeFigureOut">
               <a:rPr lang="en-CA" smtClean="0"/>
-              <a:t>2023-06-29</a:t>
+              <a:t>2023-06-30</a:t>
             </a:fld>
             <a:endParaRPr lang="en-CA"/>
           </a:p>
@@ -2402,7 +2402,7 @@
           <a:p>
             <a:fld id="{65368BD6-7643-4418-A51B-0F021EBB43CE}" type="datetimeFigureOut">
               <a:rPr lang="en-CA" smtClean="0"/>
-              <a:t>2023-06-29</a:t>
+              <a:t>2023-06-30</a:t>
             </a:fld>
             <a:endParaRPr lang="en-CA"/>
           </a:p>
@@ -2691,7 +2691,7 @@
           <a:p>
             <a:fld id="{65368BD6-7643-4418-A51B-0F021EBB43CE}" type="datetimeFigureOut">
               <a:rPr lang="en-CA" smtClean="0"/>
-              <a:t>2023-06-29</a:t>
+              <a:t>2023-06-30</a:t>
             </a:fld>
             <a:endParaRPr lang="en-CA"/>
           </a:p>
@@ -2934,7 +2934,7 @@
           <a:p>
             <a:fld id="{65368BD6-7643-4418-A51B-0F021EBB43CE}" type="datetimeFigureOut">
               <a:rPr lang="en-CA" smtClean="0"/>
-              <a:t>2023-06-29</a:t>
+              <a:t>2023-06-30</a:t>
             </a:fld>
             <a:endParaRPr lang="en-CA"/>
           </a:p>
@@ -3894,8 +3894,8 @@
         </p:nvGrpSpPr>
         <p:grpSpPr>
           <a:xfrm>
-            <a:off x="8409939" y="3804146"/>
-            <a:ext cx="1730444" cy="916588"/>
+            <a:off x="8440189" y="3842939"/>
+            <a:ext cx="1788863" cy="916588"/>
             <a:chOff x="8151970" y="3700630"/>
             <a:chExt cx="1730444" cy="916588"/>
           </a:xfrm>

</xml_diff>